<commit_message>
Edit presentation and readme file
</commit_message>
<xml_diff>
--- a/Documents/Timeless Navigators.pptx
+++ b/Documents/Timeless Navigators.pptx
@@ -28894,7 +28894,7 @@
         </p:nvSpPr>
         <p:spPr>
           <a:xfrm>
-            <a:off x="1996311" y="3767870"/>
+            <a:off x="1190642" y="3737744"/>
             <a:ext cx="2391625" cy="507600"/>
           </a:xfrm>
           <a:prstGeom prst="rect">
@@ -28942,7 +28942,7 @@
         </p:nvSpPr>
         <p:spPr>
           <a:xfrm>
-            <a:off x="2396952" y="3959091"/>
+            <a:off x="1539558" y="3909877"/>
             <a:ext cx="2119500" cy="665700"/>
           </a:xfrm>
           <a:prstGeom prst="rect">
@@ -28991,7 +28991,7 @@
         </p:nvSpPr>
         <p:spPr>
           <a:xfrm>
-            <a:off x="5039707" y="3771937"/>
+            <a:off x="5692849" y="3775399"/>
             <a:ext cx="2119500" cy="507600"/>
           </a:xfrm>
           <a:prstGeom prst="rect">
@@ -29053,7 +29053,7 @@
         </p:nvSpPr>
         <p:spPr>
           <a:xfrm>
-            <a:off x="5296738" y="3912494"/>
+            <a:off x="5904099" y="3888005"/>
             <a:ext cx="2119500" cy="665700"/>
           </a:xfrm>
           <a:prstGeom prst="rect">
@@ -29572,7 +29572,7 @@
         </p:blipFill>
         <p:spPr>
           <a:xfrm>
-            <a:off x="2503384" y="2495621"/>
+            <a:off x="1686833" y="2561276"/>
             <a:ext cx="1155674" cy="1196400"/>
           </a:xfrm>
           <a:prstGeom prst="rect">
@@ -29602,8 +29602,155 @@
         </p:blipFill>
         <p:spPr>
           <a:xfrm>
-            <a:off x="5388785" y="2626733"/>
+            <a:off x="6019280" y="2608547"/>
             <a:ext cx="1155674" cy="1141137"/>
+          </a:xfrm>
+          <a:prstGeom prst="rect">
+            <a:avLst/>
+          </a:prstGeom>
+        </p:spPr>
+      </p:pic>
+      <p:sp>
+        <p:nvSpPr>
+          <p:cNvPr id="2" name="TextBox 1">
+            <a:extLst>
+              <a:ext uri="{FF2B5EF4-FFF2-40B4-BE49-F238E27FC236}">
+                <a16:creationId xmlns:a16="http://schemas.microsoft.com/office/drawing/2014/main" id="{34AFAAB1-BBE2-4716-8987-9C6D1B1D3B24}"/>
+              </a:ext>
+            </a:extLst>
+          </p:cNvPr>
+          <p:cNvSpPr txBox="1"/>
+          <p:nvPr/>
+        </p:nvSpPr>
+        <p:spPr>
+          <a:xfrm>
+            <a:off x="3750212" y="3844533"/>
+            <a:ext cx="1697901" cy="369332"/>
+          </a:xfrm>
+          <a:prstGeom prst="rect">
+            <a:avLst/>
+          </a:prstGeom>
+          <a:noFill/>
+        </p:spPr>
+        <p:txBody>
+          <a:bodyPr wrap="none" rtlCol="0">
+            <a:spAutoFit/>
+          </a:bodyPr>
+          <a:lstStyle/>
+          <a:p>
+            <a:pPr>
+              <a:buClr>
+                <a:schemeClr val="dk1"/>
+              </a:buClr>
+              <a:buSzPts val="1800"/>
+            </a:pPr>
+            <a:r>
+              <a:rPr lang="en-US" sz="1800" b="1" dirty="0">
+                <a:solidFill>
+                  <a:schemeClr val="dk1"/>
+                </a:solidFill>
+                <a:latin typeface="El Messiri"/>
+                <a:cs typeface="El Messiri"/>
+                <a:sym typeface="Oswald"/>
+              </a:rPr>
+              <a:t>Polina </a:t>
+            </a:r>
+            <a:r>
+              <a:rPr lang="en-US" sz="1800" b="1" dirty="0" err="1">
+                <a:solidFill>
+                  <a:schemeClr val="dk1"/>
+                </a:solidFill>
+                <a:latin typeface="El Messiri"/>
+                <a:cs typeface="El Messiri"/>
+                <a:sym typeface="Oswald"/>
+              </a:rPr>
+              <a:t>Dineva</a:t>
+            </a:r>
+            <a:endParaRPr lang="bg-BG" sz="1800" b="1" dirty="0">
+              <a:solidFill>
+                <a:schemeClr val="dk1"/>
+              </a:solidFill>
+              <a:latin typeface="El Messiri"/>
+              <a:cs typeface="El Messiri"/>
+              <a:sym typeface="Oswald"/>
+            </a:endParaRPr>
+          </a:p>
+        </p:txBody>
+      </p:sp>
+      <p:sp>
+        <p:nvSpPr>
+          <p:cNvPr id="4" name="TextBox 3">
+            <a:extLst>
+              <a:ext uri="{FF2B5EF4-FFF2-40B4-BE49-F238E27FC236}">
+                <a16:creationId xmlns:a16="http://schemas.microsoft.com/office/drawing/2014/main" id="{58EB2C70-2D0C-4B5B-A62B-9F9DADB6B461}"/>
+              </a:ext>
+            </a:extLst>
+          </p:cNvPr>
+          <p:cNvSpPr txBox="1"/>
+          <p:nvPr/>
+        </p:nvSpPr>
+        <p:spPr>
+          <a:xfrm>
+            <a:off x="3724696" y="4107076"/>
+            <a:ext cx="1773992" cy="307777"/>
+          </a:xfrm>
+          <a:prstGeom prst="rect">
+            <a:avLst/>
+          </a:prstGeom>
+          <a:noFill/>
+        </p:spPr>
+        <p:txBody>
+          <a:bodyPr wrap="square" rtlCol="0">
+            <a:spAutoFit/>
+          </a:bodyPr>
+          <a:lstStyle/>
+          <a:p>
+            <a:r>
+              <a:rPr lang="en-US" dirty="0">
+                <a:solidFill>
+                  <a:schemeClr val="dk1"/>
+                </a:solidFill>
+                <a:latin typeface="Baloo 2"/>
+                <a:cs typeface="Baloo 2"/>
+                <a:sym typeface="Open Sans"/>
+              </a:rPr>
+              <a:t>Backend developer</a:t>
+            </a:r>
+            <a:endParaRPr lang="bg-BG" dirty="0">
+              <a:solidFill>
+                <a:schemeClr val="dk1"/>
+              </a:solidFill>
+              <a:latin typeface="Baloo 2"/>
+              <a:cs typeface="Baloo 2"/>
+              <a:sym typeface="Open Sans"/>
+            </a:endParaRPr>
+          </a:p>
+        </p:txBody>
+      </p:sp>
+      <p:pic>
+        <p:nvPicPr>
+          <p:cNvPr id="6" name="Picture 5">
+            <a:extLst>
+              <a:ext uri="{FF2B5EF4-FFF2-40B4-BE49-F238E27FC236}">
+                <a16:creationId xmlns:a16="http://schemas.microsoft.com/office/drawing/2014/main" id="{EEBDD44A-386A-4374-9721-D5270B9C85A0}"/>
+              </a:ext>
+            </a:extLst>
+          </p:cNvPr>
+          <p:cNvPicPr>
+            <a:picLocks noChangeAspect="1"/>
+          </p:cNvPicPr>
+          <p:nvPr/>
+        </p:nvPicPr>
+        <p:blipFill>
+          <a:blip r:embed="rId7"/>
+          <a:stretch>
+            <a:fillRect/>
+          </a:stretch>
+        </p:blipFill>
+        <p:spPr>
+          <a:xfrm>
+            <a:off x="3997852" y="2561276"/>
+            <a:ext cx="1202620" cy="1196400"/>
           </a:xfrm>
           <a:prstGeom prst="rect">
             <a:avLst/>

</xml_diff>